<commit_message>
part 1 - finished
</commit_message>
<xml_diff>
--- a/power point/Linux Basic Commands.pptx
+++ b/power point/Linux Basic Commands.pptx
@@ -6235,7 +6235,7 @@
             <p:ph idx="1"/>
             <p:extLst>
               <p:ext uri="{D42A27DB-BD31-4B8C-83A1-F6EECF244321}">
-                <p14:modId xmlns:p14="http://schemas.microsoft.com/office/powerpoint/2010/main" val="4168123465"/>
+                <p14:modId xmlns:p14="http://schemas.microsoft.com/office/powerpoint/2010/main" val="748326790"/>
               </p:ext>
             </p:extLst>
           </p:nvPr>
@@ -6421,7 +6421,7 @@
                     <a:p>
                       <a:r>
                         <a:rPr lang="en-US" dirty="0"/>
-                        <a:t>You cam simply remove files using rm.</a:t>
+                        <a:t>You can simply remove files using rm.</a:t>
                       </a:r>
                     </a:p>
                   </a:txBody>
@@ -6922,7 +6922,7 @@
             <p:ph idx="1"/>
             <p:extLst>
               <p:ext uri="{D42A27DB-BD31-4B8C-83A1-F6EECF244321}">
-                <p14:modId xmlns:p14="http://schemas.microsoft.com/office/powerpoint/2010/main" val="4288491517"/>
+                <p14:modId xmlns:p14="http://schemas.microsoft.com/office/powerpoint/2010/main" val="3073898930"/>
               </p:ext>
             </p:extLst>
           </p:nvPr>
@@ -7180,7 +7180,15 @@
                     <a:p>
                       <a:r>
                         <a:rPr lang="en-US" dirty="0"/>
-                        <a:t>Sed s/(the word to find)/(the word to replace with)/g</a:t>
+                        <a:t>s</a:t>
+                      </a:r>
+                      <a:r>
+                        <a:rPr lang="en-US"/>
+                        <a:t>ed </a:t>
+                      </a:r>
+                      <a:r>
+                        <a:rPr lang="en-US" dirty="0"/>
+                        <a:t>s/(the word to find)/(the word to replace with)/g</a:t>
                       </a:r>
                     </a:p>
                   </a:txBody>

</xml_diff>